<commit_message>
Added testRobot preference so we can switch back and forth between competition bot and test robot. Redid April Tags to be bigger just in case we need to find it further away.
</commit_message>
<xml_diff>
--- a/TeamCode/src/main/tag36h11/signal-sleeve-template-ppt-version.pptx
+++ b/TeamCode/src/main/tag36h11/signal-sleeve-template-ppt-version.pptx
@@ -188,7 +188,7 @@
           <a:p>
             <a:fld id="{1D8BD707-D9CF-40AE-B4C6-C98DA3205C09}" type="datetimeFigureOut">
               <a:rPr lang="en-US"/>
-              <a:t>9/18/2022</a:t>
+              <a:t>9/21/2022</a:t>
             </a:fld>
             <a:endParaRPr lang="en-US"/>
           </a:p>
@@ -393,7 +393,7 @@
           <a:p>
             <a:fld id="{1D8BD707-D9CF-40AE-B4C6-C98DA3205C09}" type="datetimeFigureOut">
               <a:rPr lang="en-US"/>
-              <a:t>9/18/2022</a:t>
+              <a:t>9/21/2022</a:t>
             </a:fld>
             <a:endParaRPr lang="en-US"/>
           </a:p>
@@ -633,7 +633,7 @@
           <a:p>
             <a:fld id="{1D8BD707-D9CF-40AE-B4C6-C98DA3205C09}" type="datetimeFigureOut">
               <a:rPr lang="en-US"/>
-              <a:t>9/18/2022</a:t>
+              <a:t>9/21/2022</a:t>
             </a:fld>
             <a:endParaRPr lang="en-US"/>
           </a:p>
@@ -807,7 +807,7 @@
           <a:p>
             <a:fld id="{1D8BD707-D9CF-40AE-B4C6-C98DA3205C09}" type="datetimeFigureOut">
               <a:rPr lang="en-US"/>
-              <a:t>9/18/2022</a:t>
+              <a:t>9/21/2022</a:t>
             </a:fld>
             <a:endParaRPr lang="en-US"/>
           </a:p>
@@ -950,7 +950,7 @@
           <a:p>
             <a:fld id="{1D8BD707-D9CF-40AE-B4C6-C98DA3205C09}" type="datetimeFigureOut">
               <a:rPr lang="en-US"/>
-              <a:t>9/18/2022</a:t>
+              <a:t>9/21/2022</a:t>
             </a:fld>
             <a:endParaRPr lang="en-US"/>
           </a:p>
@@ -5386,10 +5386,10 @@
       </p:sp>
       <p:pic>
         <p:nvPicPr>
-          <p:cNvPr id="8" name="Picture 7">
+          <p:cNvPr id="6" name="Picture 5">
             <a:extLst>
               <a:ext uri="{FF2B5EF4-FFF2-40B4-BE49-F238E27FC236}">
-                <a16:creationId xmlns:a16="http://schemas.microsoft.com/office/drawing/2014/main" id="{FA8EADEF-9AA8-69DF-EFEC-E63EBC7D0E43}"/>
+                <a16:creationId xmlns:a16="http://schemas.microsoft.com/office/drawing/2014/main" id="{2104530A-3A67-0008-2688-D3999AC2F8B5}"/>
               </a:ext>
             </a:extLst>
           </p:cNvPr>
@@ -5405,9 +5405,9 @@
           </a:stretch>
         </p:blipFill>
         <p:spPr>
-          <a:xfrm rot="1065918">
-            <a:off x="1748243" y="4013978"/>
-            <a:ext cx="1732071" cy="2240046"/>
+          <a:xfrm>
+            <a:off x="4267200" y="4800600"/>
+            <a:ext cx="1819382" cy="1824981"/>
           </a:xfrm>
           <a:prstGeom prst="rect">
             <a:avLst/>
@@ -5416,10 +5416,10 @@
       </p:pic>
       <p:pic>
         <p:nvPicPr>
-          <p:cNvPr id="10" name="Picture 9">
+          <p:cNvPr id="8" name="Picture 7">
             <a:extLst>
               <a:ext uri="{FF2B5EF4-FFF2-40B4-BE49-F238E27FC236}">
-                <a16:creationId xmlns:a16="http://schemas.microsoft.com/office/drawing/2014/main" id="{09C2A31A-9593-20E4-8F2E-6C54BD97127F}"/>
+                <a16:creationId xmlns:a16="http://schemas.microsoft.com/office/drawing/2014/main" id="{17F69E23-73D9-C127-3543-2B77F6B51A76}"/>
               </a:ext>
             </a:extLst>
           </p:cNvPr>
@@ -5435,9 +5435,9 @@
           </a:stretch>
         </p:blipFill>
         <p:spPr>
-          <a:xfrm>
-            <a:off x="4343399" y="4441371"/>
-            <a:ext cx="1731281" cy="2239024"/>
+          <a:xfrm rot="1116459">
+            <a:off x="1663306" y="4391854"/>
+            <a:ext cx="1819391" cy="1824981"/>
           </a:xfrm>
           <a:prstGeom prst="rect">
             <a:avLst/>
@@ -5446,10 +5446,10 @@
       </p:pic>
       <p:pic>
         <p:nvPicPr>
-          <p:cNvPr id="12" name="Picture 11">
+          <p:cNvPr id="10" name="Picture 9">
             <a:extLst>
               <a:ext uri="{FF2B5EF4-FFF2-40B4-BE49-F238E27FC236}">
-                <a16:creationId xmlns:a16="http://schemas.microsoft.com/office/drawing/2014/main" id="{26CB266E-A774-5400-9EB0-5C3B71FD0290}"/>
+                <a16:creationId xmlns:a16="http://schemas.microsoft.com/office/drawing/2014/main" id="{DFE912D0-B0DD-BDAB-F0A2-A424D53A2F16}"/>
               </a:ext>
             </a:extLst>
           </p:cNvPr>
@@ -5465,9 +5465,9 @@
           </a:stretch>
         </p:blipFill>
         <p:spPr>
-          <a:xfrm rot="20466145">
-            <a:off x="6951238" y="4092653"/>
-            <a:ext cx="1671773" cy="2163752"/>
+          <a:xfrm rot="20494755">
+            <a:off x="6880450" y="4391854"/>
+            <a:ext cx="1824981" cy="1824981"/>
           </a:xfrm>
           <a:prstGeom prst="rect">
             <a:avLst/>

</xml_diff>